<commit_message>
Further work on speech classification
</commit_message>
<xml_diff>
--- a/lsm_paper/Digit Recognition Experiment Description.pptx
+++ b/lsm_paper/Digit Recognition Experiment Description.pptx
@@ -8,6 +8,7 @@
     <p:sldId id="256" r:id="rId2"/>
     <p:sldId id="291" r:id="rId3"/>
     <p:sldId id="295" r:id="rId4"/>
+    <p:sldId id="296" r:id="rId5"/>
   </p:sldIdLst>
   <p:sldSz cx="12192000" cy="6858000"/>
   <p:notesSz cx="6858000" cy="9144000"/>
@@ -438,7 +439,7 @@
           <a:p>
             <a:fld id="{0BC610E4-0AD4-4B2C-A1AF-CEC06808CA2D}" type="datetimeFigureOut">
               <a:rPr lang="en-US" smtClean="0"/>
-              <a:t>11/21/2019</a:t>
+              <a:t>1/9/2020</a:t>
             </a:fld>
             <a:endParaRPr lang="en-US"/>
           </a:p>
@@ -654,7 +655,7 @@
           <a:p>
             <a:fld id="{0BC610E4-0AD4-4B2C-A1AF-CEC06808CA2D}" type="datetimeFigureOut">
               <a:rPr lang="en-US" smtClean="0"/>
-              <a:t>11/21/2019</a:t>
+              <a:t>1/9/2020</a:t>
             </a:fld>
             <a:endParaRPr lang="en-US"/>
           </a:p>
@@ -860,7 +861,7 @@
           <a:p>
             <a:fld id="{0BC610E4-0AD4-4B2C-A1AF-CEC06808CA2D}" type="datetimeFigureOut">
               <a:rPr lang="en-US" smtClean="0"/>
-              <a:t>11/21/2019</a:t>
+              <a:t>1/9/2020</a:t>
             </a:fld>
             <a:endParaRPr lang="en-US"/>
           </a:p>
@@ -1133,7 +1134,7 @@
           <a:p>
             <a:fld id="{0BC610E4-0AD4-4B2C-A1AF-CEC06808CA2D}" type="datetimeFigureOut">
               <a:rPr lang="en-US" smtClean="0"/>
-              <a:t>11/21/2019</a:t>
+              <a:t>1/9/2020</a:t>
             </a:fld>
             <a:endParaRPr lang="en-US"/>
           </a:p>
@@ -1416,7 +1417,7 @@
           <a:p>
             <a:fld id="{0BC610E4-0AD4-4B2C-A1AF-CEC06808CA2D}" type="datetimeFigureOut">
               <a:rPr lang="en-US" smtClean="0"/>
-              <a:t>11/21/2019</a:t>
+              <a:t>1/9/2020</a:t>
             </a:fld>
             <a:endParaRPr lang="en-US"/>
           </a:p>
@@ -1836,7 +1837,7 @@
           <a:p>
             <a:fld id="{0BC610E4-0AD4-4B2C-A1AF-CEC06808CA2D}" type="datetimeFigureOut">
               <a:rPr lang="en-US" smtClean="0"/>
-              <a:t>11/21/2019</a:t>
+              <a:t>1/9/2020</a:t>
             </a:fld>
             <a:endParaRPr lang="en-US"/>
           </a:p>
@@ -1985,7 +1986,7 @@
           <a:p>
             <a:fld id="{0BC610E4-0AD4-4B2C-A1AF-CEC06808CA2D}" type="datetimeFigureOut">
               <a:rPr lang="en-US" smtClean="0"/>
-              <a:t>11/21/2019</a:t>
+              <a:t>1/9/2020</a:t>
             </a:fld>
             <a:endParaRPr lang="en-US"/>
           </a:p>
@@ -2106,7 +2107,7 @@
           <a:p>
             <a:fld id="{0BC610E4-0AD4-4B2C-A1AF-CEC06808CA2D}" type="datetimeFigureOut">
               <a:rPr lang="en-US" smtClean="0"/>
-              <a:t>11/21/2019</a:t>
+              <a:t>1/9/2020</a:t>
             </a:fld>
             <a:endParaRPr lang="en-US"/>
           </a:p>
@@ -2425,7 +2426,7 @@
           <a:p>
             <a:fld id="{0BC610E4-0AD4-4B2C-A1AF-CEC06808CA2D}" type="datetimeFigureOut">
               <a:rPr lang="en-US" smtClean="0"/>
-              <a:t>11/21/2019</a:t>
+              <a:t>1/9/2020</a:t>
             </a:fld>
             <a:endParaRPr lang="en-US"/>
           </a:p>
@@ -2721,7 +2722,7 @@
           <a:p>
             <a:fld id="{0BC610E4-0AD4-4B2C-A1AF-CEC06808CA2D}" type="datetimeFigureOut">
               <a:rPr lang="en-US" smtClean="0"/>
-              <a:t>11/21/2019</a:t>
+              <a:t>1/9/2020</a:t>
             </a:fld>
             <a:endParaRPr lang="en-US"/>
           </a:p>
@@ -4112,6 +4113,189 @@
 </p:sld>
 </file>
 
+<file path=ppt/slides/slide4.xml><?xml version="1.0" encoding="utf-8"?>
+<p:sld xmlns:a="http://schemas.openxmlformats.org/drawingml/2006/main" xmlns:r="http://schemas.openxmlformats.org/officeDocument/2006/relationships" xmlns:p="http://schemas.openxmlformats.org/presentationml/2006/main">
+  <p:cSld>
+    <p:spTree>
+      <p:nvGrpSpPr>
+        <p:cNvPr id="1" name=""/>
+        <p:cNvGrpSpPr/>
+        <p:nvPr/>
+      </p:nvGrpSpPr>
+      <p:grpSpPr>
+        <a:xfrm>
+          <a:off x="0" y="0"/>
+          <a:ext cx="0" cy="0"/>
+          <a:chOff x="0" y="0"/>
+          <a:chExt cx="0" cy="0"/>
+        </a:xfrm>
+      </p:grpSpPr>
+      <p:sp>
+        <p:nvSpPr>
+          <p:cNvPr id="2" name="Title 1">
+            <a:extLst>
+              <a:ext uri="{FF2B5EF4-FFF2-40B4-BE49-F238E27FC236}">
+                <a16:creationId xmlns:a16="http://schemas.microsoft.com/office/drawing/2014/main" id="{193E1FC5-98DE-400D-B964-39314647F16A}"/>
+              </a:ext>
+            </a:extLst>
+          </p:cNvPr>
+          <p:cNvSpPr>
+            <a:spLocks noGrp="1"/>
+          </p:cNvSpPr>
+          <p:nvPr>
+            <p:ph type="title"/>
+          </p:nvPr>
+        </p:nvSpPr>
+        <p:spPr/>
+        <p:txBody>
+          <a:bodyPr/>
+          <a:lstStyle/>
+          <a:p>
+            <a:r>
+              <a:rPr lang="en-US" dirty="0"/>
+              <a:t>Initial results</a:t>
+            </a:r>
+          </a:p>
+        </p:txBody>
+      </p:sp>
+      <p:sp>
+        <p:nvSpPr>
+          <p:cNvPr id="3" name="Content Placeholder 2">
+            <a:extLst>
+              <a:ext uri="{FF2B5EF4-FFF2-40B4-BE49-F238E27FC236}">
+                <a16:creationId xmlns:a16="http://schemas.microsoft.com/office/drawing/2014/main" id="{DF139D36-FEF2-4719-978F-7DF7C9A2A384}"/>
+              </a:ext>
+            </a:extLst>
+          </p:cNvPr>
+          <p:cNvSpPr>
+            <a:spLocks noGrp="1"/>
+          </p:cNvSpPr>
+          <p:nvPr>
+            <p:ph idx="1"/>
+          </p:nvPr>
+        </p:nvSpPr>
+        <p:spPr>
+          <a:xfrm>
+            <a:off x="838200" y="1825625"/>
+            <a:ext cx="10515600" cy="1914168"/>
+          </a:xfrm>
+        </p:spPr>
+        <p:txBody>
+          <a:bodyPr/>
+          <a:lstStyle/>
+          <a:p>
+            <a:r>
+              <a:rPr lang="en-US" dirty="0"/>
+              <a:t>Used MATLAB linear binary classifier (</a:t>
+            </a:r>
+            <a:r>
+              <a:rPr lang="en-US" dirty="0" err="1"/>
+              <a:t>fitclinear</a:t>
+            </a:r>
+            <a:r>
+              <a:rPr lang="en-US" dirty="0"/>
+              <a:t>) with default arguments</a:t>
+            </a:r>
+          </a:p>
+          <a:p>
+            <a:r>
+              <a:rPr lang="en-US" dirty="0"/>
+              <a:t>Used 100% of data for training and testing</a:t>
+            </a:r>
+          </a:p>
+          <a:p>
+            <a:r>
+              <a:rPr lang="en-US" dirty="0"/>
+              <a:t>For each digit, recorded % digit correctly recognized and % of other digits falsely recognized</a:t>
+            </a:r>
+          </a:p>
+        </p:txBody>
+      </p:sp>
+      <p:pic>
+        <p:nvPicPr>
+          <p:cNvPr id="5" name="Picture 4">
+            <a:extLst>
+              <a:ext uri="{FF2B5EF4-FFF2-40B4-BE49-F238E27FC236}">
+                <a16:creationId xmlns:a16="http://schemas.microsoft.com/office/drawing/2014/main" id="{48F57962-E914-419E-BB13-F161253AF967}"/>
+              </a:ext>
+            </a:extLst>
+          </p:cNvPr>
+          <p:cNvPicPr>
+            <a:picLocks noChangeAspect="1"/>
+          </p:cNvPicPr>
+          <p:nvPr/>
+        </p:nvPicPr>
+        <p:blipFill>
+          <a:blip r:embed="rId2">
+            <a:extLst>
+              <a:ext uri="{28A0092B-C50C-407E-A947-70E740481C1C}">
+                <a14:useLocalDpi xmlns:a14="http://schemas.microsoft.com/office/drawing/2010/main" val="0"/>
+              </a:ext>
+            </a:extLst>
+          </a:blip>
+          <a:stretch>
+            <a:fillRect/>
+          </a:stretch>
+        </p:blipFill>
+        <p:spPr>
+          <a:xfrm>
+            <a:off x="1980680" y="3739793"/>
+            <a:ext cx="3803674" cy="2852756"/>
+          </a:xfrm>
+          <a:prstGeom prst="rect">
+            <a:avLst/>
+          </a:prstGeom>
+        </p:spPr>
+      </p:pic>
+      <p:pic>
+        <p:nvPicPr>
+          <p:cNvPr id="7" name="Picture 6">
+            <a:extLst>
+              <a:ext uri="{FF2B5EF4-FFF2-40B4-BE49-F238E27FC236}">
+                <a16:creationId xmlns:a16="http://schemas.microsoft.com/office/drawing/2014/main" id="{85F075BC-01F6-4935-8AE3-07471338A6AC}"/>
+              </a:ext>
+            </a:extLst>
+          </p:cNvPr>
+          <p:cNvPicPr>
+            <a:picLocks noChangeAspect="1"/>
+          </p:cNvPicPr>
+          <p:nvPr/>
+        </p:nvPicPr>
+        <p:blipFill>
+          <a:blip r:embed="rId3">
+            <a:extLst>
+              <a:ext uri="{28A0092B-C50C-407E-A947-70E740481C1C}">
+                <a14:useLocalDpi xmlns:a14="http://schemas.microsoft.com/office/drawing/2010/main" val="0"/>
+              </a:ext>
+            </a:extLst>
+          </a:blip>
+          <a:stretch>
+            <a:fillRect/>
+          </a:stretch>
+        </p:blipFill>
+        <p:spPr>
+          <a:xfrm>
+            <a:off x="5597181" y="3739793"/>
+            <a:ext cx="3803674" cy="2852756"/>
+          </a:xfrm>
+          <a:prstGeom prst="rect">
+            <a:avLst/>
+          </a:prstGeom>
+        </p:spPr>
+      </p:pic>
+    </p:spTree>
+    <p:extLst>
+      <p:ext uri="{BB962C8B-B14F-4D97-AF65-F5344CB8AC3E}">
+        <p14:creationId xmlns:p14="http://schemas.microsoft.com/office/powerpoint/2010/main" val="3470037637"/>
+      </p:ext>
+    </p:extLst>
+  </p:cSld>
+  <p:clrMapOvr>
+    <a:masterClrMapping/>
+  </p:clrMapOvr>
+</p:sld>
+</file>
+
 <file path=ppt/theme/theme1.xml><?xml version="1.0" encoding="utf-8"?>
 <a:theme xmlns:a="http://schemas.openxmlformats.org/drawingml/2006/main" name="Office Theme">
   <a:themeElements>

</xml_diff>